<commit_message>
ui form init for loading window
</commit_message>
<xml_diff>
--- a/Mysterium Email.pptx
+++ b/Mysterium Email.pptx
@@ -6,6 +6,7 @@
   </p:sldMasterIdLst>
   <p:sldIdLst>
     <p:sldId id="256" r:id="rId2"/>
+    <p:sldId id="257" r:id="rId3"/>
   </p:sldIdLst>
   <p:sldSz cx="12192000" cy="6858000"/>
   <p:notesSz cx="6858000" cy="9144000"/>
@@ -104,6 +105,11 @@
       </a:defRPr>
     </a:lvl9pPr>
   </p:defaultTextStyle>
+  <p:extLst>
+    <p:ext uri="{EFAFB233-063F-42B5-8137-9DF3F51BA10A}">
+      <p15:sldGuideLst xmlns:p15="http://schemas.microsoft.com/office/powerpoint/2012/main"/>
+    </p:ext>
+  </p:extLst>
 </p:presentation>
 </file>
 
@@ -596,7 +602,7 @@
           <a:p>
             <a:fld id="{72345051-2045-45DA-935E-2E3CA1A69ADC}" type="datetimeFigureOut">
               <a:rPr lang="en-US" smtClean="0"/>
-              <a:t>3/23/2020</a:t>
+              <a:t>3/26/2020</a:t>
             </a:fld>
             <a:endParaRPr lang="en-US"/>
           </a:p>
@@ -794,7 +800,7 @@
           <a:p>
             <a:fld id="{72345051-2045-45DA-935E-2E3CA1A69ADC}" type="datetimeFigureOut">
               <a:rPr lang="en-US" smtClean="0"/>
-              <a:t>3/23/2020</a:t>
+              <a:t>3/26/2020</a:t>
             </a:fld>
             <a:endParaRPr lang="en-US"/>
           </a:p>
@@ -1002,7 +1008,7 @@
           <a:p>
             <a:fld id="{72345051-2045-45DA-935E-2E3CA1A69ADC}" type="datetimeFigureOut">
               <a:rPr lang="en-US" smtClean="0"/>
-              <a:t>3/23/2020</a:t>
+              <a:t>3/26/2020</a:t>
             </a:fld>
             <a:endParaRPr lang="en-US"/>
           </a:p>
@@ -1225,7 +1231,7 @@
           <a:p>
             <a:fld id="{72345051-2045-45DA-935E-2E3CA1A69ADC}" type="datetimeFigureOut">
               <a:rPr lang="en-US" smtClean="0"/>
-              <a:t>3/23/2020</a:t>
+              <a:t>3/26/2020</a:t>
             </a:fld>
             <a:endParaRPr lang="en-US"/>
           </a:p>
@@ -2136,7 +2142,7 @@
           <a:p>
             <a:fld id="{72345051-2045-45DA-935E-2E3CA1A69ADC}" type="datetimeFigureOut">
               <a:rPr lang="en-US" smtClean="0"/>
-              <a:t>3/23/2020</a:t>
+              <a:t>3/26/2020</a:t>
             </a:fld>
             <a:endParaRPr lang="en-US"/>
           </a:p>
@@ -2740,7 +2746,7 @@
           <a:p>
             <a:fld id="{72345051-2045-45DA-935E-2E3CA1A69ADC}" type="datetimeFigureOut">
               <a:rPr lang="en-US" smtClean="0"/>
-              <a:t>3/23/2020</a:t>
+              <a:t>3/26/2020</a:t>
             </a:fld>
             <a:endParaRPr lang="en-US"/>
           </a:p>
@@ -3789,7 +3795,7 @@
           <a:p>
             <a:fld id="{72345051-2045-45DA-935E-2E3CA1A69ADC}" type="datetimeFigureOut">
               <a:rPr lang="en-US" smtClean="0"/>
-              <a:t>3/23/2020</a:t>
+              <a:t>3/26/2020</a:t>
             </a:fld>
             <a:endParaRPr lang="en-US"/>
           </a:p>
@@ -4573,7 +4579,7 @@
           <a:p>
             <a:fld id="{72345051-2045-45DA-935E-2E3CA1A69ADC}" type="datetimeFigureOut">
               <a:rPr lang="en-US" smtClean="0"/>
-              <a:t>3/23/2020</a:t>
+              <a:t>3/26/2020</a:t>
             </a:fld>
             <a:endParaRPr lang="en-US"/>
           </a:p>
@@ -5022,7 +5028,7 @@
           <a:p>
             <a:fld id="{72345051-2045-45DA-935E-2E3CA1A69ADC}" type="datetimeFigureOut">
               <a:rPr lang="en-US" smtClean="0"/>
-              <a:t>3/23/2020</a:t>
+              <a:t>3/26/2020</a:t>
             </a:fld>
             <a:endParaRPr lang="en-US"/>
           </a:p>
@@ -5339,7 +5345,7 @@
           <a:p>
             <a:fld id="{72345051-2045-45DA-935E-2E3CA1A69ADC}" type="datetimeFigureOut">
               <a:rPr lang="en-US" smtClean="0"/>
-              <a:t>3/23/2020</a:t>
+              <a:t>3/26/2020</a:t>
             </a:fld>
             <a:endParaRPr lang="en-US"/>
           </a:p>
@@ -5967,7 +5973,7 @@
           <a:p>
             <a:fld id="{72345051-2045-45DA-935E-2E3CA1A69ADC}" type="datetimeFigureOut">
               <a:rPr lang="en-US" smtClean="0"/>
-              <a:t>3/23/2020</a:t>
+              <a:t>3/26/2020</a:t>
             </a:fld>
             <a:endParaRPr lang="en-US"/>
           </a:p>
@@ -6542,7 +6548,7 @@
           <a:p>
             <a:fld id="{72345051-2045-45DA-935E-2E3CA1A69ADC}" type="datetimeFigureOut">
               <a:rPr lang="en-US" smtClean="0"/>
-              <a:t>3/23/2020</a:t>
+              <a:t>3/26/2020</a:t>
             </a:fld>
             <a:endParaRPr lang="en-US"/>
           </a:p>
@@ -7167,18 +7173,21 @@
           <a:p>
             <a:pPr algn="ctr"/>
             <a:r>
-              <a:rPr lang="en-US" sz="6000">
+              <a:rPr lang="en-US" sz="6000" dirty="0" err="1">
                 <a:solidFill>
                   <a:schemeClr val="bg1"/>
                 </a:solidFill>
               </a:rPr>
-              <a:t>Mysterium Email</a:t>
+              <a:t>Mysterium</a:t>
             </a:r>
-            <a:endParaRPr lang="en-US" sz="6000" dirty="0">
-              <a:solidFill>
-                <a:schemeClr val="bg1"/>
-              </a:solidFill>
-            </a:endParaRPr>
+            <a:r>
+              <a:rPr lang="en-US" sz="6000" dirty="0">
+                <a:solidFill>
+                  <a:schemeClr val="bg1"/>
+                </a:solidFill>
+              </a:rPr>
+              <a:t> Email</a:t>
+            </a:r>
           </a:p>
         </p:txBody>
       </p:sp>
@@ -7301,6 +7310,118 @@
     <p:extLst>
       <p:ext uri="{BB962C8B-B14F-4D97-AF65-F5344CB8AC3E}">
         <p14:creationId xmlns:p14="http://schemas.microsoft.com/office/powerpoint/2010/main" val="3035984664"/>
+      </p:ext>
+    </p:extLst>
+  </p:cSld>
+  <p:clrMapOvr>
+    <a:masterClrMapping/>
+  </p:clrMapOvr>
+</p:sld>
+</file>
+
+<file path=ppt/slides/slide2.xml><?xml version="1.0" encoding="utf-8"?>
+<p:sld xmlns:a="http://schemas.openxmlformats.org/drawingml/2006/main" xmlns:r="http://schemas.openxmlformats.org/officeDocument/2006/relationships" xmlns:p="http://schemas.openxmlformats.org/presentationml/2006/main">
+  <p:cSld>
+    <p:spTree>
+      <p:nvGrpSpPr>
+        <p:cNvPr id="1" name=""/>
+        <p:cNvGrpSpPr/>
+        <p:nvPr/>
+      </p:nvGrpSpPr>
+      <p:grpSpPr>
+        <a:xfrm>
+          <a:off x="0" y="0"/>
+          <a:ext cx="0" cy="0"/>
+          <a:chOff x="0" y="0"/>
+          <a:chExt cx="0" cy="0"/>
+        </a:xfrm>
+      </p:grpSpPr>
+      <p:pic>
+        <p:nvPicPr>
+          <p:cNvPr id="5" name="Picture 4" descr="A screenshot of a cell phone&#10;&#10;Description automatically generated">
+            <a:extLst>
+              <a:ext uri="{FF2B5EF4-FFF2-40B4-BE49-F238E27FC236}">
+                <a16:creationId xmlns:a16="http://schemas.microsoft.com/office/drawing/2014/main" id="{231FCEC5-D517-47B8-8419-9E6017FFB38E}"/>
+              </a:ext>
+            </a:extLst>
+          </p:cNvPr>
+          <p:cNvPicPr>
+            <a:picLocks noChangeAspect="1"/>
+          </p:cNvPicPr>
+          <p:nvPr/>
+        </p:nvPicPr>
+        <p:blipFill>
+          <a:blip r:embed="rId2">
+            <a:extLst>
+              <a:ext uri="{28A0092B-C50C-407E-A947-70E740481C1C}">
+                <a14:useLocalDpi xmlns:a14="http://schemas.microsoft.com/office/drawing/2010/main" val="0"/>
+              </a:ext>
+            </a:extLst>
+          </a:blip>
+          <a:stretch>
+            <a:fillRect/>
+          </a:stretch>
+        </p:blipFill>
+        <p:spPr>
+          <a:xfrm>
+            <a:off x="4188" y="1"/>
+            <a:ext cx="12187811" cy="6860356"/>
+          </a:xfrm>
+          <a:prstGeom prst="rect">
+            <a:avLst/>
+          </a:prstGeom>
+        </p:spPr>
+      </p:pic>
+      <p:sp>
+        <p:nvSpPr>
+          <p:cNvPr id="7" name="Multiplication Sign 6">
+            <a:extLst>
+              <a:ext uri="{FF2B5EF4-FFF2-40B4-BE49-F238E27FC236}">
+                <a16:creationId xmlns:a16="http://schemas.microsoft.com/office/drawing/2014/main" id="{96781CD4-BD59-49C4-8E62-B3394AE54D2A}"/>
+              </a:ext>
+            </a:extLst>
+          </p:cNvPr>
+          <p:cNvSpPr/>
+          <p:nvPr/>
+        </p:nvSpPr>
+        <p:spPr>
+          <a:xfrm>
+            <a:off x="235670" y="577392"/>
+            <a:ext cx="12273698" cy="7852528"/>
+          </a:xfrm>
+          <a:prstGeom prst="mathMultiply">
+            <a:avLst/>
+          </a:prstGeom>
+        </p:spPr>
+        <p:style>
+          <a:lnRef idx="2">
+            <a:schemeClr val="accent1">
+              <a:shade val="50000"/>
+            </a:schemeClr>
+          </a:lnRef>
+          <a:fillRef idx="1">
+            <a:schemeClr val="accent1"/>
+          </a:fillRef>
+          <a:effectRef idx="0">
+            <a:schemeClr val="accent1"/>
+          </a:effectRef>
+          <a:fontRef idx="minor">
+            <a:schemeClr val="lt1"/>
+          </a:fontRef>
+        </p:style>
+        <p:txBody>
+          <a:bodyPr rtlCol="0" anchor="ctr"/>
+          <a:lstStyle/>
+          <a:p>
+            <a:pPr algn="ctr"/>
+            <a:endParaRPr lang="en-US"/>
+          </a:p>
+        </p:txBody>
+      </p:sp>
+    </p:spTree>
+    <p:extLst>
+      <p:ext uri="{BB962C8B-B14F-4D97-AF65-F5344CB8AC3E}">
+        <p14:creationId xmlns:p14="http://schemas.microsoft.com/office/powerpoint/2010/main" val="539371404"/>
       </p:ext>
     </p:extLst>
   </p:cSld>

</xml_diff>